<commit_message>
small updates to data.csv saved formatting and powerpoint
</commit_message>
<xml_diff>
--- a/Simple Express Tracker Overview.pptx
+++ b/Simple Express Tracker Overview.pptx
@@ -13380,7 +13380,7 @@
             <p:ph idx="1"/>
             <p:extLst>
               <p:ext uri="{D42A27DB-BD31-4B8C-83A1-F6EECF244321}">
-                <p14:modId xmlns:p14="http://schemas.microsoft.com/office/powerpoint/2010/main" val="3719991635"/>
+                <p14:modId xmlns:p14="http://schemas.microsoft.com/office/powerpoint/2010/main" val="1859646943"/>
               </p:ext>
             </p:extLst>
           </p:nvPr>
@@ -13525,7 +13525,7 @@
                           <a:effectLst/>
                           <a:latin typeface="+mn-lt"/>
                         </a:rPr>
-                        <a:t>1/1/25</a:t>
+                        <a:t>2025-01-01</a:t>
                       </a:r>
                     </a:p>
                   </a:txBody>
@@ -13598,7 +13598,7 @@
                           <a:effectLst/>
                           <a:latin typeface="+mn-lt"/>
                         </a:rPr>
-                        <a:t>10/9/25</a:t>
+                        <a:t>2025-10-09</a:t>
                       </a:r>
                     </a:p>
                   </a:txBody>
@@ -13664,14 +13664,14 @@
                         <a:buNone/>
                       </a:pPr>
                       <a:r>
-                        <a:rPr lang="en-US" sz="1800" b="0" i="0" u="none" strike="noStrike" dirty="0">
+                        <a:rPr lang="en-US" sz="1800" b="0" i="0" u="none" strike="noStrike">
                           <a:solidFill>
                             <a:srgbClr val="000000"/>
                           </a:solidFill>
                           <a:effectLst/>
                           <a:latin typeface="+mn-lt"/>
                         </a:rPr>
-                        <a:t>10/24/25</a:t>
+                        <a:t>2025-10-24</a:t>
                       </a:r>
                     </a:p>
                   </a:txBody>
@@ -13737,14 +13737,14 @@
                         <a:buNone/>
                       </a:pPr>
                       <a:r>
-                        <a:rPr lang="en-US" sz="1800" b="0" i="0" u="none" strike="noStrike" dirty="0">
+                        <a:rPr lang="en-US" sz="1800" b="0" i="0" u="none" strike="noStrike">
                           <a:solidFill>
                             <a:srgbClr val="000000"/>
                           </a:solidFill>
                           <a:effectLst/>
                           <a:latin typeface="+mn-lt"/>
                         </a:rPr>
-                        <a:t>12/1/25</a:t>
+                        <a:t>2025-12-01</a:t>
                       </a:r>
                     </a:p>
                   </a:txBody>
@@ -13810,14 +13810,14 @@
                         <a:buNone/>
                       </a:pPr>
                       <a:r>
-                        <a:rPr lang="en-US" sz="1800" b="0" i="0" u="none" strike="noStrike" dirty="0">
+                        <a:rPr lang="en-US" sz="1800" b="0" i="0" u="none" strike="noStrike">
                           <a:solidFill>
                             <a:srgbClr val="000000"/>
                           </a:solidFill>
                           <a:effectLst/>
                           <a:latin typeface="+mn-lt"/>
                         </a:rPr>
-                        <a:t>2/26/25</a:t>
+                        <a:t>2025-02-26</a:t>
                       </a:r>
                     </a:p>
                   </a:txBody>
@@ -13890,7 +13890,7 @@
                           <a:effectLst/>
                           <a:latin typeface="+mn-lt"/>
                         </a:rPr>
-                        <a:t>7/18/25</a:t>
+                        <a:t>2025-07-18</a:t>
                       </a:r>
                     </a:p>
                   </a:txBody>
@@ -14015,14 +14015,14 @@
             <p:ph idx="1"/>
             <p:extLst>
               <p:ext uri="{D42A27DB-BD31-4B8C-83A1-F6EECF244321}">
-                <p14:modId xmlns:p14="http://schemas.microsoft.com/office/powerpoint/2010/main" val="516285836"/>
+                <p14:modId xmlns:p14="http://schemas.microsoft.com/office/powerpoint/2010/main" val="542845887"/>
               </p:ext>
             </p:extLst>
           </p:nvPr>
         </p:nvGraphicFramePr>
         <p:xfrm>
           <a:off x="1141413" y="2249488"/>
-          <a:ext cx="9906000" cy="2291080"/>
+          <a:ext cx="9906000" cy="2931160"/>
         </p:xfrm>
         <a:graphic>
           <a:graphicData uri="http://schemas.openxmlformats.org/drawingml/2006/table">
@@ -14151,6 +14151,7 @@
                     <a:bodyPr/>
                     <a:lstStyle/>
                     <a:p>
+                      <a:pPr algn="r"/>
                       <a:r>
                         <a:rPr lang="en-US" dirty="0"/>
                         <a:t>N/A</a:t>
@@ -14197,6 +14198,7 @@
                     <a:bodyPr/>
                     <a:lstStyle/>
                     <a:p>
+                      <a:pPr algn="r"/>
                       <a:r>
                         <a:rPr lang="en-US" dirty="0"/>
                         <a:t>10</a:t>
@@ -14210,6 +14212,7 @@
                     <a:bodyPr/>
                     <a:lstStyle/>
                     <a:p>
+                      <a:pPr algn="r"/>
                       <a:r>
                         <a:rPr lang="en-US" dirty="0"/>
                         <a:t>12-30-2025</a:t>
@@ -14336,7 +14339,7 @@
                           <a:effectLst/>
                           <a:latin typeface="+mn-lt"/>
                         </a:rPr>
-                        <a:t>10/24/25</a:t>
+                        <a:t>2025-10-24</a:t>
                       </a:r>
                     </a:p>
                   </a:txBody>
@@ -14358,6 +14361,92 @@
                 <a:extLst>
                   <a:ext uri="{0D108BD9-81ED-4DB2-BD59-A6C34878D82A}">
                     <a16:rowId xmlns:a16="http://schemas.microsoft.com/office/drawing/2014/main" val="3352348714"/>
+                  </a:ext>
+                </a:extLst>
+              </a:tr>
+              <a:tr h="370840">
+                <a:tc>
+                  <a:txBody>
+                    <a:bodyPr/>
+                    <a:lstStyle/>
+                    <a:p>
+                      <a:pPr algn="l" fontAlgn="b">
+                        <a:buNone/>
+                      </a:pPr>
+                      <a:r>
+                        <a:rPr lang="en-US" sz="1800" b="0" i="0" u="none" strike="noStrike" dirty="0">
+                          <a:solidFill>
+                            <a:srgbClr val="000000"/>
+                          </a:solidFill>
+                          <a:effectLst/>
+                          <a:latin typeface="+mn-lt"/>
+                        </a:rPr>
+                        <a:t>Car</a:t>
+                      </a:r>
+                    </a:p>
+                  </a:txBody>
+                  <a:tcPr marL="9525" marR="9525" marT="9525" marB="0" anchor="b"/>
+                </a:tc>
+                <a:tc>
+                  <a:txBody>
+                    <a:bodyPr/>
+                    <a:lstStyle/>
+                    <a:p>
+                      <a:pPr algn="r" fontAlgn="b">
+                        <a:buNone/>
+                      </a:pPr>
+                      <a:r>
+                        <a:rPr lang="en-US" sz="1800" b="0" i="0" u="none" strike="noStrike" dirty="0">
+                          <a:solidFill>
+                            <a:srgbClr val="000000"/>
+                          </a:solidFill>
+                          <a:effectLst/>
+                          <a:latin typeface="+mn-lt"/>
+                        </a:rPr>
+                        <a:t>75</a:t>
+                      </a:r>
+                    </a:p>
+                  </a:txBody>
+                  <a:tcPr marL="9525" marR="9525" marT="9525" marB="0" anchor="b"/>
+                </a:tc>
+                <a:tc>
+                  <a:txBody>
+                    <a:bodyPr/>
+                    <a:lstStyle/>
+                    <a:p>
+                      <a:pPr algn="r" fontAlgn="b">
+                        <a:buNone/>
+                      </a:pPr>
+                      <a:r>
+                        <a:rPr lang="en-US" sz="1800" b="0" i="0" u="none" strike="noStrike" dirty="0">
+                          <a:solidFill>
+                            <a:srgbClr val="000000"/>
+                          </a:solidFill>
+                          <a:effectLst/>
+                          <a:latin typeface="+mn-lt"/>
+                        </a:rPr>
+                        <a:t>2025-01-01</a:t>
+                      </a:r>
+                    </a:p>
+                  </a:txBody>
+                  <a:tcPr marL="9525" marR="9525" marT="9525" marB="0" anchor="b"/>
+                </a:tc>
+                <a:tc>
+                  <a:txBody>
+                    <a:bodyPr/>
+                    <a:lstStyle/>
+                    <a:p>
+                      <a:r>
+                        <a:rPr lang="en-US" dirty="0"/>
+                        <a:t>Successfully added expense</a:t>
+                      </a:r>
+                    </a:p>
+                  </a:txBody>
+                  <a:tcPr/>
+                </a:tc>
+                <a:extLst>
+                  <a:ext uri="{0D108BD9-81ED-4DB2-BD59-A6C34878D82A}">
+                    <a16:rowId xmlns:a16="http://schemas.microsoft.com/office/drawing/2014/main" val="179811661"/>
                   </a:ext>
                 </a:extLst>
               </a:tr>

</xml_diff>

<commit_message>
updated powerpoint to explain changes and implementation within Java code
</commit_message>
<xml_diff>
--- a/Simple Express Tracker Overview.pptx
+++ b/Simple Express Tracker Overview.pptx
@@ -108,6 +108,11 @@
       </a:defRPr>
     </a:lvl9pPr>
   </p:defaultTextStyle>
+  <p:extLst>
+    <p:ext uri="{EFAFB233-063F-42B5-8137-9DF3F51BA10A}">
+      <p15:sldGuideLst xmlns:p15="http://schemas.microsoft.com/office/powerpoint/2012/main"/>
+    </p:ext>
+  </p:extLst>
 </p:presentation>
 </file>
 
@@ -161,7 +166,7 @@
           <a:noFill/>
           <a:extLst>
             <a:ext uri="{909E8E84-426E-40dd-AFC4-6F175D3DCCD1}">
-              <a14:hiddenFill xmlns:a14="http://schemas.microsoft.com/office/drawing/2010/main" xmlns="">
+              <a14:hiddenFill xmlns="" xmlns:a14="http://schemas.microsoft.com/office/drawing/2010/main">
                 <a:solidFill>
                   <a:srgbClr val="FFFFFF"/>
                 </a:solidFill>
@@ -221,7 +226,7 @@
             </a:ln>
             <a:extLst>
               <a:ext uri="{91240B29-F687-4f45-9708-019B960494DF}">
-                <a14:hiddenLine xmlns:a14="http://schemas.microsoft.com/office/drawing/2010/main" xmlns="" w="9525">
+                <a14:hiddenLine xmlns="" xmlns:a14="http://schemas.microsoft.com/office/drawing/2010/main" w="9525">
                   <a:solidFill>
                     <a:srgbClr val="000000"/>
                   </a:solidFill>
@@ -318,7 +323,7 @@
             </a:ln>
             <a:extLst>
               <a:ext uri="{91240B29-F687-4f45-9708-019B960494DF}">
-                <a14:hiddenLine xmlns:a14="http://schemas.microsoft.com/office/drawing/2010/main" xmlns="" w="9525">
+                <a14:hiddenLine xmlns="" xmlns:a14="http://schemas.microsoft.com/office/drawing/2010/main" w="9525">
                   <a:solidFill>
                     <a:srgbClr val="000000"/>
                   </a:solidFill>
@@ -415,7 +420,7 @@
             </a:ln>
             <a:extLst>
               <a:ext uri="{91240B29-F687-4f45-9708-019B960494DF}">
-                <a14:hiddenLine xmlns:a14="http://schemas.microsoft.com/office/drawing/2010/main" xmlns="" w="9525">
+                <a14:hiddenLine xmlns="" xmlns:a14="http://schemas.microsoft.com/office/drawing/2010/main" w="9525">
                   <a:solidFill>
                     <a:srgbClr val="000000"/>
                   </a:solidFill>
@@ -456,7 +461,7 @@
             </a:ln>
             <a:extLst>
               <a:ext uri="{91240B29-F687-4f45-9708-019B960494DF}">
-                <a14:hiddenLine xmlns:a14="http://schemas.microsoft.com/office/drawing/2010/main" xmlns="" w="9525">
+                <a14:hiddenLine xmlns="" xmlns:a14="http://schemas.microsoft.com/office/drawing/2010/main" w="9525">
                   <a:solidFill>
                     <a:srgbClr val="000000"/>
                   </a:solidFill>
@@ -553,7 +558,7 @@
             </a:ln>
             <a:extLst>
               <a:ext uri="{91240B29-F687-4f45-9708-019B960494DF}">
-                <a14:hiddenLine xmlns:a14="http://schemas.microsoft.com/office/drawing/2010/main" xmlns="" w="9525">
+                <a14:hiddenLine xmlns="" xmlns:a14="http://schemas.microsoft.com/office/drawing/2010/main" w="9525">
                   <a:solidFill>
                     <a:srgbClr val="000000"/>
                   </a:solidFill>
@@ -622,7 +627,7 @@
             </a:ln>
             <a:extLst>
               <a:ext uri="{91240B29-F687-4f45-9708-019B960494DF}">
-                <a14:hiddenLine xmlns:a14="http://schemas.microsoft.com/office/drawing/2010/main" xmlns="" w="9525">
+                <a14:hiddenLine xmlns="" xmlns:a14="http://schemas.microsoft.com/office/drawing/2010/main" w="9525">
                   <a:solidFill>
                     <a:srgbClr val="000000"/>
                   </a:solidFill>
@@ -691,7 +696,7 @@
             </a:ln>
             <a:extLst>
               <a:ext uri="{91240B29-F687-4f45-9708-019B960494DF}">
-                <a14:hiddenLine xmlns:a14="http://schemas.microsoft.com/office/drawing/2010/main" xmlns="" w="9525">
+                <a14:hiddenLine xmlns="" xmlns:a14="http://schemas.microsoft.com/office/drawing/2010/main" w="9525">
                   <a:solidFill>
                     <a:srgbClr val="000000"/>
                   </a:solidFill>
@@ -788,7 +793,7 @@
             </a:ln>
             <a:extLst>
               <a:ext uri="{91240B29-F687-4f45-9708-019B960494DF}">
-                <a14:hiddenLine xmlns:a14="http://schemas.microsoft.com/office/drawing/2010/main" xmlns="" w="9525">
+                <a14:hiddenLine xmlns="" xmlns:a14="http://schemas.microsoft.com/office/drawing/2010/main" w="9525">
                   <a:solidFill>
                     <a:srgbClr val="000000"/>
                   </a:solidFill>
@@ -857,7 +862,7 @@
             </a:ln>
             <a:extLst>
               <a:ext uri="{91240B29-F687-4f45-9708-019B960494DF}">
-                <a14:hiddenLine xmlns:a14="http://schemas.microsoft.com/office/drawing/2010/main" xmlns="" w="9525">
+                <a14:hiddenLine xmlns="" xmlns:a14="http://schemas.microsoft.com/office/drawing/2010/main" w="9525">
                   <a:solidFill>
                     <a:srgbClr val="000000"/>
                   </a:solidFill>
@@ -926,7 +931,7 @@
             </a:ln>
             <a:extLst>
               <a:ext uri="{91240B29-F687-4f45-9708-019B960494DF}">
-                <a14:hiddenLine xmlns:a14="http://schemas.microsoft.com/office/drawing/2010/main" xmlns="" w="9525">
+                <a14:hiddenLine xmlns="" xmlns:a14="http://schemas.microsoft.com/office/drawing/2010/main" w="9525">
                   <a:solidFill>
                     <a:srgbClr val="000000"/>
                   </a:solidFill>
@@ -1023,7 +1028,7 @@
             </a:ln>
             <a:extLst>
               <a:ext uri="{91240B29-F687-4f45-9708-019B960494DF}">
-                <a14:hiddenLine xmlns:a14="http://schemas.microsoft.com/office/drawing/2010/main" xmlns="" w="9525">
+                <a14:hiddenLine xmlns="" xmlns:a14="http://schemas.microsoft.com/office/drawing/2010/main" w="9525">
                   <a:solidFill>
                     <a:srgbClr val="000000"/>
                   </a:solidFill>
@@ -1120,7 +1125,7 @@
             </a:ln>
             <a:extLst>
               <a:ext uri="{91240B29-F687-4f45-9708-019B960494DF}">
-                <a14:hiddenLine xmlns:a14="http://schemas.microsoft.com/office/drawing/2010/main" xmlns="" w="9525">
+                <a14:hiddenLine xmlns="" xmlns:a14="http://schemas.microsoft.com/office/drawing/2010/main" w="9525">
                   <a:solidFill>
                     <a:srgbClr val="000000"/>
                   </a:solidFill>
@@ -1189,7 +1194,7 @@
             </a:ln>
             <a:extLst>
               <a:ext uri="{91240B29-F687-4f45-9708-019B960494DF}">
-                <a14:hiddenLine xmlns:a14="http://schemas.microsoft.com/office/drawing/2010/main" xmlns="" w="9525">
+                <a14:hiddenLine xmlns="" xmlns:a14="http://schemas.microsoft.com/office/drawing/2010/main" w="9525">
                   <a:solidFill>
                     <a:srgbClr val="000000"/>
                   </a:solidFill>
@@ -1306,7 +1311,7 @@
             </a:ln>
             <a:extLst>
               <a:ext uri="{91240B29-F687-4f45-9708-019B960494DF}">
-                <a14:hiddenLine xmlns:a14="http://schemas.microsoft.com/office/drawing/2010/main" xmlns="" w="9525">
+                <a14:hiddenLine xmlns="" xmlns:a14="http://schemas.microsoft.com/office/drawing/2010/main" w="9525">
                   <a:solidFill>
                     <a:srgbClr val="000000"/>
                   </a:solidFill>
@@ -1375,7 +1380,7 @@
             </a:ln>
             <a:extLst>
               <a:ext uri="{91240B29-F687-4f45-9708-019B960494DF}">
-                <a14:hiddenLine xmlns:a14="http://schemas.microsoft.com/office/drawing/2010/main" xmlns="" w="9525">
+                <a14:hiddenLine xmlns="" xmlns:a14="http://schemas.microsoft.com/office/drawing/2010/main" w="9525">
                   <a:solidFill>
                     <a:srgbClr val="000000"/>
                   </a:solidFill>
@@ -1472,7 +1477,7 @@
             </a:ln>
             <a:extLst>
               <a:ext uri="{91240B29-F687-4f45-9708-019B960494DF}">
-                <a14:hiddenLine xmlns:a14="http://schemas.microsoft.com/office/drawing/2010/main" xmlns="" w="9525">
+                <a14:hiddenLine xmlns="" xmlns:a14="http://schemas.microsoft.com/office/drawing/2010/main" w="9525">
                   <a:solidFill>
                     <a:srgbClr val="000000"/>
                   </a:solidFill>
@@ -1569,7 +1574,7 @@
             </a:ln>
             <a:extLst>
               <a:ext uri="{91240B29-F687-4f45-9708-019B960494DF}">
-                <a14:hiddenLine xmlns:a14="http://schemas.microsoft.com/office/drawing/2010/main" xmlns="" w="9525">
+                <a14:hiddenLine xmlns="" xmlns:a14="http://schemas.microsoft.com/office/drawing/2010/main" w="9525">
                   <a:solidFill>
                     <a:srgbClr val="000000"/>
                   </a:solidFill>
@@ -1638,7 +1643,7 @@
             </a:ln>
             <a:extLst>
               <a:ext uri="{91240B29-F687-4f45-9708-019B960494DF}">
-                <a14:hiddenLine xmlns:a14="http://schemas.microsoft.com/office/drawing/2010/main" xmlns="" w="9525">
+                <a14:hiddenLine xmlns="" xmlns:a14="http://schemas.microsoft.com/office/drawing/2010/main" w="9525">
                   <a:solidFill>
                     <a:srgbClr val="000000"/>
                   </a:solidFill>
@@ -1735,7 +1740,7 @@
             </a:ln>
             <a:extLst>
               <a:ext uri="{91240B29-F687-4f45-9708-019B960494DF}">
-                <a14:hiddenLine xmlns:a14="http://schemas.microsoft.com/office/drawing/2010/main" xmlns="" w="9525">
+                <a14:hiddenLine xmlns="" xmlns:a14="http://schemas.microsoft.com/office/drawing/2010/main" w="9525">
                   <a:solidFill>
                     <a:srgbClr val="000000"/>
                   </a:solidFill>
@@ -1832,7 +1837,7 @@
             </a:ln>
             <a:extLst>
               <a:ext uri="{91240B29-F687-4f45-9708-019B960494DF}">
-                <a14:hiddenLine xmlns:a14="http://schemas.microsoft.com/office/drawing/2010/main" xmlns="" w="9525">
+                <a14:hiddenLine xmlns="" xmlns:a14="http://schemas.microsoft.com/office/drawing/2010/main" w="9525">
                   <a:solidFill>
                     <a:srgbClr val="000000"/>
                   </a:solidFill>
@@ -1895,7 +1900,7 @@
             </a:ln>
             <a:extLst>
               <a:ext uri="{91240B29-F687-4f45-9708-019B960494DF}">
-                <a14:hiddenLine xmlns:a14="http://schemas.microsoft.com/office/drawing/2010/main" xmlns="" w="9525">
+                <a14:hiddenLine xmlns="" xmlns:a14="http://schemas.microsoft.com/office/drawing/2010/main" w="9525">
                   <a:solidFill>
                     <a:srgbClr val="000000"/>
                   </a:solidFill>
@@ -1992,7 +1997,7 @@
             </a:ln>
             <a:extLst>
               <a:ext uri="{91240B29-F687-4f45-9708-019B960494DF}">
-                <a14:hiddenLine xmlns:a14="http://schemas.microsoft.com/office/drawing/2010/main" xmlns="" w="9525">
+                <a14:hiddenLine xmlns="" xmlns:a14="http://schemas.microsoft.com/office/drawing/2010/main" w="9525">
                   <a:solidFill>
                     <a:srgbClr val="000000"/>
                   </a:solidFill>
@@ -2055,7 +2060,7 @@
             </a:ln>
             <a:extLst>
               <a:ext uri="{91240B29-F687-4f45-9708-019B960494DF}">
-                <a14:hiddenLine xmlns:a14="http://schemas.microsoft.com/office/drawing/2010/main" xmlns="" w="9525">
+                <a14:hiddenLine xmlns="" xmlns:a14="http://schemas.microsoft.com/office/drawing/2010/main" w="9525">
                   <a:solidFill>
                     <a:srgbClr val="000000"/>
                   </a:solidFill>
@@ -2152,7 +2157,7 @@
             </a:ln>
             <a:extLst>
               <a:ext uri="{91240B29-F687-4f45-9708-019B960494DF}">
-                <a14:hiddenLine xmlns:a14="http://schemas.microsoft.com/office/drawing/2010/main" xmlns="" w="9525">
+                <a14:hiddenLine xmlns="" xmlns:a14="http://schemas.microsoft.com/office/drawing/2010/main" w="9525">
                   <a:solidFill>
                     <a:srgbClr val="000000"/>
                   </a:solidFill>
@@ -2227,7 +2232,7 @@
             </a:ln>
             <a:extLst>
               <a:ext uri="{91240B29-F687-4f45-9708-019B960494DF}">
-                <a14:hiddenLine xmlns:a14="http://schemas.microsoft.com/office/drawing/2010/main" xmlns="" w="9525">
+                <a14:hiddenLine xmlns="" xmlns:a14="http://schemas.microsoft.com/office/drawing/2010/main" w="9525">
                   <a:solidFill>
                     <a:srgbClr val="000000"/>
                   </a:solidFill>
@@ -2324,7 +2329,7 @@
             </a:ln>
             <a:extLst>
               <a:ext uri="{91240B29-F687-4f45-9708-019B960494DF}">
-                <a14:hiddenLine xmlns:a14="http://schemas.microsoft.com/office/drawing/2010/main" xmlns="" w="9525">
+                <a14:hiddenLine xmlns="" xmlns:a14="http://schemas.microsoft.com/office/drawing/2010/main" w="9525">
                   <a:solidFill>
                     <a:srgbClr val="000000"/>
                   </a:solidFill>
@@ -2399,7 +2404,7 @@
             </a:ln>
             <a:extLst>
               <a:ext uri="{91240B29-F687-4f45-9708-019B960494DF}">
-                <a14:hiddenLine xmlns:a14="http://schemas.microsoft.com/office/drawing/2010/main" xmlns="" w="9525">
+                <a14:hiddenLine xmlns="" xmlns:a14="http://schemas.microsoft.com/office/drawing/2010/main" w="9525">
                   <a:solidFill>
                     <a:srgbClr val="000000"/>
                   </a:solidFill>
@@ -2496,7 +2501,7 @@
             </a:ln>
             <a:extLst>
               <a:ext uri="{91240B29-F687-4f45-9708-019B960494DF}">
-                <a14:hiddenLine xmlns:a14="http://schemas.microsoft.com/office/drawing/2010/main" xmlns="" w="9525">
+                <a14:hiddenLine xmlns="" xmlns:a14="http://schemas.microsoft.com/office/drawing/2010/main" w="9525">
                   <a:solidFill>
                     <a:srgbClr val="000000"/>
                   </a:solidFill>
@@ -2537,7 +2542,7 @@
             </a:ln>
             <a:extLst>
               <a:ext uri="{91240B29-F687-4f45-9708-019B960494DF}">
-                <a14:hiddenLine xmlns:a14="http://schemas.microsoft.com/office/drawing/2010/main" xmlns="" w="9525">
+                <a14:hiddenLine xmlns="" xmlns:a14="http://schemas.microsoft.com/office/drawing/2010/main" w="9525">
                   <a:solidFill>
                     <a:srgbClr val="000000"/>
                   </a:solidFill>
@@ -2634,7 +2639,7 @@
             </a:ln>
             <a:extLst>
               <a:ext uri="{91240B29-F687-4f45-9708-019B960494DF}">
-                <a14:hiddenLine xmlns:a14="http://schemas.microsoft.com/office/drawing/2010/main" xmlns="" w="9525">
+                <a14:hiddenLine xmlns="" xmlns:a14="http://schemas.microsoft.com/office/drawing/2010/main" w="9525">
                   <a:solidFill>
                     <a:srgbClr val="000000"/>
                   </a:solidFill>
@@ -2703,7 +2708,7 @@
             </a:ln>
             <a:extLst>
               <a:ext uri="{91240B29-F687-4f45-9708-019B960494DF}">
-                <a14:hiddenLine xmlns:a14="http://schemas.microsoft.com/office/drawing/2010/main" xmlns="" w="9525">
+                <a14:hiddenLine xmlns="" xmlns:a14="http://schemas.microsoft.com/office/drawing/2010/main" w="9525">
                   <a:solidFill>
                     <a:srgbClr val="000000"/>
                   </a:solidFill>
@@ -2772,7 +2777,7 @@
             </a:ln>
             <a:extLst>
               <a:ext uri="{91240B29-F687-4f45-9708-019B960494DF}">
-                <a14:hiddenLine xmlns:a14="http://schemas.microsoft.com/office/drawing/2010/main" xmlns="" w="9525">
+                <a14:hiddenLine xmlns="" xmlns:a14="http://schemas.microsoft.com/office/drawing/2010/main" w="9525">
                   <a:solidFill>
                     <a:srgbClr val="000000"/>
                   </a:solidFill>
@@ -2869,7 +2874,7 @@
             </a:ln>
             <a:extLst>
               <a:ext uri="{91240B29-F687-4f45-9708-019B960494DF}">
-                <a14:hiddenLine xmlns:a14="http://schemas.microsoft.com/office/drawing/2010/main" xmlns="" w="9525">
+                <a14:hiddenLine xmlns="" xmlns:a14="http://schemas.microsoft.com/office/drawing/2010/main" w="9525">
                   <a:solidFill>
                     <a:srgbClr val="000000"/>
                   </a:solidFill>
@@ -2944,7 +2949,7 @@
             </a:ln>
             <a:extLst>
               <a:ext uri="{91240B29-F687-4f45-9708-019B960494DF}">
-                <a14:hiddenLine xmlns:a14="http://schemas.microsoft.com/office/drawing/2010/main" xmlns="" w="9525">
+                <a14:hiddenLine xmlns="" xmlns:a14="http://schemas.microsoft.com/office/drawing/2010/main" w="9525">
                   <a:solidFill>
                     <a:srgbClr val="000000"/>
                   </a:solidFill>
@@ -3013,7 +3018,7 @@
             </a:ln>
             <a:extLst>
               <a:ext uri="{91240B29-F687-4f45-9708-019B960494DF}">
-                <a14:hiddenLine xmlns:a14="http://schemas.microsoft.com/office/drawing/2010/main" xmlns="" w="9525">
+                <a14:hiddenLine xmlns="" xmlns:a14="http://schemas.microsoft.com/office/drawing/2010/main" w="9525">
                   <a:solidFill>
                     <a:srgbClr val="000000"/>
                   </a:solidFill>
@@ -3110,7 +3115,7 @@
             </a:ln>
             <a:extLst>
               <a:ext uri="{91240B29-F687-4f45-9708-019B960494DF}">
-                <a14:hiddenLine xmlns:a14="http://schemas.microsoft.com/office/drawing/2010/main" xmlns="" w="9525">
+                <a14:hiddenLine xmlns="" xmlns:a14="http://schemas.microsoft.com/office/drawing/2010/main" w="9525">
                   <a:solidFill>
                     <a:srgbClr val="000000"/>
                   </a:solidFill>
@@ -3179,7 +3184,7 @@
             </a:ln>
             <a:extLst>
               <a:ext uri="{91240B29-F687-4f45-9708-019B960494DF}">
-                <a14:hiddenLine xmlns:a14="http://schemas.microsoft.com/office/drawing/2010/main" xmlns="" w="9525">
+                <a14:hiddenLine xmlns="" xmlns:a14="http://schemas.microsoft.com/office/drawing/2010/main" w="9525">
                   <a:solidFill>
                     <a:srgbClr val="000000"/>
                   </a:solidFill>
@@ -3276,7 +3281,7 @@
             </a:ln>
             <a:extLst>
               <a:ext uri="{91240B29-F687-4f45-9708-019B960494DF}">
-                <a14:hiddenLine xmlns:a14="http://schemas.microsoft.com/office/drawing/2010/main" xmlns="" w="9525">
+                <a14:hiddenLine xmlns="" xmlns:a14="http://schemas.microsoft.com/office/drawing/2010/main" w="9525">
                   <a:solidFill>
                     <a:srgbClr val="000000"/>
                   </a:solidFill>
@@ -3345,7 +3350,7 @@
             </a:ln>
             <a:extLst>
               <a:ext uri="{91240B29-F687-4f45-9708-019B960494DF}">
-                <a14:hiddenLine xmlns:a14="http://schemas.microsoft.com/office/drawing/2010/main" xmlns="" w="9525">
+                <a14:hiddenLine xmlns="" xmlns:a14="http://schemas.microsoft.com/office/drawing/2010/main" w="9525">
                   <a:solidFill>
                     <a:srgbClr val="000000"/>
                   </a:solidFill>
@@ -3442,7 +3447,7 @@
             </a:ln>
             <a:extLst>
               <a:ext uri="{91240B29-F687-4f45-9708-019B960494DF}">
-                <a14:hiddenLine xmlns:a14="http://schemas.microsoft.com/office/drawing/2010/main" xmlns="" w="9525">
+                <a14:hiddenLine xmlns="" xmlns:a14="http://schemas.microsoft.com/office/drawing/2010/main" w="9525">
                   <a:solidFill>
                     <a:srgbClr val="000000"/>
                   </a:solidFill>
@@ -3483,7 +3488,7 @@
             </a:ln>
             <a:extLst>
               <a:ext uri="{91240B29-F687-4f45-9708-019B960494DF}">
-                <a14:hiddenLine xmlns:a14="http://schemas.microsoft.com/office/drawing/2010/main" xmlns="" w="9525">
+                <a14:hiddenLine xmlns="" xmlns:a14="http://schemas.microsoft.com/office/drawing/2010/main" w="9525">
                   <a:solidFill>
                     <a:srgbClr val="000000"/>
                   </a:solidFill>
@@ -3555,7 +3560,7 @@
             </a:ln>
             <a:extLst>
               <a:ext uri="{91240B29-F687-4f45-9708-019B960494DF}">
-                <a14:hiddenLine xmlns:a14="http://schemas.microsoft.com/office/drawing/2010/main" xmlns="" w="9525">
+                <a14:hiddenLine xmlns="" xmlns:a14="http://schemas.microsoft.com/office/drawing/2010/main" w="9525">
                   <a:solidFill>
                     <a:srgbClr val="000000"/>
                   </a:solidFill>
@@ -3652,7 +3657,7 @@
             </a:ln>
             <a:extLst>
               <a:ext uri="{91240B29-F687-4f45-9708-019B960494DF}">
-                <a14:hiddenLine xmlns:a14="http://schemas.microsoft.com/office/drawing/2010/main" xmlns="" w="9525">
+                <a14:hiddenLine xmlns="" xmlns:a14="http://schemas.microsoft.com/office/drawing/2010/main" w="9525">
                   <a:solidFill>
                     <a:srgbClr val="000000"/>
                   </a:solidFill>
@@ -3721,7 +3726,7 @@
             </a:ln>
             <a:extLst>
               <a:ext uri="{91240B29-F687-4f45-9708-019B960494DF}">
-                <a14:hiddenLine xmlns:a14="http://schemas.microsoft.com/office/drawing/2010/main" xmlns="" w="9525">
+                <a14:hiddenLine xmlns="" xmlns:a14="http://schemas.microsoft.com/office/drawing/2010/main" w="9525">
                   <a:solidFill>
                     <a:srgbClr val="000000"/>
                   </a:solidFill>
@@ -3818,7 +3823,7 @@
             </a:ln>
             <a:extLst>
               <a:ext uri="{91240B29-F687-4f45-9708-019B960494DF}">
-                <a14:hiddenLine xmlns:a14="http://schemas.microsoft.com/office/drawing/2010/main" xmlns="" w="9525">
+                <a14:hiddenLine xmlns="" xmlns:a14="http://schemas.microsoft.com/office/drawing/2010/main" w="9525">
                   <a:solidFill>
                     <a:srgbClr val="000000"/>
                   </a:solidFill>
@@ -3915,7 +3920,7 @@
             </a:ln>
             <a:extLst>
               <a:ext uri="{91240B29-F687-4f45-9708-019B960494DF}">
-                <a14:hiddenLine xmlns:a14="http://schemas.microsoft.com/office/drawing/2010/main" xmlns="" w="9525">
+                <a14:hiddenLine xmlns="" xmlns:a14="http://schemas.microsoft.com/office/drawing/2010/main" w="9525">
                   <a:solidFill>
                     <a:srgbClr val="000000"/>
                   </a:solidFill>
@@ -3987,7 +3992,7 @@
             </a:ln>
             <a:extLst>
               <a:ext uri="{91240B29-F687-4f45-9708-019B960494DF}">
-                <a14:hiddenLine xmlns:a14="http://schemas.microsoft.com/office/drawing/2010/main" xmlns="" w="9525">
+                <a14:hiddenLine xmlns="" xmlns:a14="http://schemas.microsoft.com/office/drawing/2010/main" w="9525">
                   <a:solidFill>
                     <a:srgbClr val="000000"/>
                   </a:solidFill>
@@ -4056,7 +4061,7 @@
             </a:ln>
             <a:extLst>
               <a:ext uri="{91240B29-F687-4f45-9708-019B960494DF}">
-                <a14:hiddenLine xmlns:a14="http://schemas.microsoft.com/office/drawing/2010/main" xmlns="" w="9525">
+                <a14:hiddenLine xmlns="" xmlns:a14="http://schemas.microsoft.com/office/drawing/2010/main" w="9525">
                   <a:solidFill>
                     <a:srgbClr val="000000"/>
                   </a:solidFill>
@@ -4153,7 +4158,7 @@
             </a:ln>
             <a:extLst>
               <a:ext uri="{91240B29-F687-4f45-9708-019B960494DF}">
-                <a14:hiddenLine xmlns:a14="http://schemas.microsoft.com/office/drawing/2010/main" xmlns="" w="9525">
+                <a14:hiddenLine xmlns="" xmlns:a14="http://schemas.microsoft.com/office/drawing/2010/main" w="9525">
                   <a:solidFill>
                     <a:srgbClr val="000000"/>
                   </a:solidFill>
@@ -4250,7 +4255,7 @@
             </a:ln>
             <a:extLst>
               <a:ext uri="{91240B29-F687-4f45-9708-019B960494DF}">
-                <a14:hiddenLine xmlns:a14="http://schemas.microsoft.com/office/drawing/2010/main" xmlns="" w="9525">
+                <a14:hiddenLine xmlns="" xmlns:a14="http://schemas.microsoft.com/office/drawing/2010/main" w="9525">
                   <a:solidFill>
                     <a:srgbClr val="000000"/>
                   </a:solidFill>
@@ -4319,7 +4324,7 @@
             </a:ln>
             <a:extLst>
               <a:ext uri="{91240B29-F687-4f45-9708-019B960494DF}">
-                <a14:hiddenLine xmlns:a14="http://schemas.microsoft.com/office/drawing/2010/main" xmlns="" w="9525">
+                <a14:hiddenLine xmlns="" xmlns:a14="http://schemas.microsoft.com/office/drawing/2010/main" w="9525">
                   <a:solidFill>
                     <a:srgbClr val="000000"/>
                   </a:solidFill>
@@ -4446,7 +4451,7 @@
             </a:ln>
             <a:extLst>
               <a:ext uri="{91240B29-F687-4f45-9708-019B960494DF}">
-                <a14:hiddenLine xmlns:a14="http://schemas.microsoft.com/office/drawing/2010/main" xmlns="" w="9525">
+                <a14:hiddenLine xmlns="" xmlns:a14="http://schemas.microsoft.com/office/drawing/2010/main" w="9525">
                   <a:solidFill>
                     <a:srgbClr val="000000"/>
                   </a:solidFill>
@@ -4521,7 +4526,7 @@
             </a:ln>
             <a:extLst>
               <a:ext uri="{91240B29-F687-4f45-9708-019B960494DF}">
-                <a14:hiddenLine xmlns:a14="http://schemas.microsoft.com/office/drawing/2010/main" xmlns="" w="9525">
+                <a14:hiddenLine xmlns="" xmlns:a14="http://schemas.microsoft.com/office/drawing/2010/main" w="9525">
                   <a:solidFill>
                     <a:srgbClr val="000000"/>
                   </a:solidFill>
@@ -4618,7 +4623,7 @@
             </a:ln>
             <a:extLst>
               <a:ext uri="{91240B29-F687-4f45-9708-019B960494DF}">
-                <a14:hiddenLine xmlns:a14="http://schemas.microsoft.com/office/drawing/2010/main" xmlns="" w="9525">
+                <a14:hiddenLine xmlns="" xmlns:a14="http://schemas.microsoft.com/office/drawing/2010/main" w="9525">
                   <a:solidFill>
                     <a:srgbClr val="000000"/>
                   </a:solidFill>
@@ -4765,7 +4770,7 @@
           <a:p>
             <a:fld id="{48A87A34-81AB-432B-8DAE-1953F412C126}" type="datetimeFigureOut">
               <a:rPr lang="en-US" dirty="0"/>
-              <a:t>12/10/25</a:t>
+              <a:t>12/17/25</a:t>
             </a:fld>
             <a:endParaRPr lang="en-US" dirty="0"/>
           </a:p>
@@ -5027,7 +5032,7 @@
           <a:p>
             <a:fld id="{48A87A34-81AB-432B-8DAE-1953F412C126}" type="datetimeFigureOut">
               <a:rPr lang="en-US" dirty="0"/>
-              <a:t>12/10/25</a:t>
+              <a:t>12/17/25</a:t>
             </a:fld>
             <a:endParaRPr lang="en-US" dirty="0"/>
           </a:p>
@@ -5218,7 +5223,7 @@
           <a:p>
             <a:fld id="{48A87A34-81AB-432B-8DAE-1953F412C126}" type="datetimeFigureOut">
               <a:rPr lang="en-US" dirty="0"/>
-              <a:t>12/10/25</a:t>
+              <a:t>12/17/25</a:t>
             </a:fld>
             <a:endParaRPr lang="en-US" dirty="0"/>
           </a:p>
@@ -5476,7 +5481,7 @@
           <a:p>
             <a:fld id="{48A87A34-81AB-432B-8DAE-1953F412C126}" type="datetimeFigureOut">
               <a:rPr lang="en-US" dirty="0"/>
-              <a:t>12/10/25</a:t>
+              <a:t>12/17/25</a:t>
             </a:fld>
             <a:endParaRPr lang="en-US" dirty="0"/>
           </a:p>
@@ -5905,7 +5910,7 @@
           <a:p>
             <a:fld id="{48A87A34-81AB-432B-8DAE-1953F412C126}" type="datetimeFigureOut">
               <a:rPr lang="en-US" dirty="0"/>
-              <a:t>12/10/25</a:t>
+              <a:t>12/17/25</a:t>
             </a:fld>
             <a:endParaRPr lang="en-US" dirty="0"/>
           </a:p>
@@ -6446,7 +6451,7 @@
           <a:p>
             <a:fld id="{48A87A34-81AB-432B-8DAE-1953F412C126}" type="datetimeFigureOut">
               <a:rPr lang="en-US" dirty="0"/>
-              <a:t>12/10/25</a:t>
+              <a:t>12/17/25</a:t>
             </a:fld>
             <a:endParaRPr lang="en-US" dirty="0"/>
           </a:p>
@@ -7161,7 +7166,7 @@
           <a:p>
             <a:fld id="{48A87A34-81AB-432B-8DAE-1953F412C126}" type="datetimeFigureOut">
               <a:rPr lang="en-US" dirty="0"/>
-              <a:t>12/10/25</a:t>
+              <a:t>12/17/25</a:t>
             </a:fld>
             <a:endParaRPr lang="en-US" dirty="0"/>
           </a:p>
@@ -7326,7 +7331,7 @@
           <a:p>
             <a:fld id="{48A87A34-81AB-432B-8DAE-1953F412C126}" type="datetimeFigureOut">
               <a:rPr lang="en-US" dirty="0"/>
-              <a:t>12/10/25</a:t>
+              <a:t>12/17/25</a:t>
             </a:fld>
             <a:endParaRPr lang="en-US" dirty="0"/>
           </a:p>
@@ -7501,7 +7506,7 @@
           <a:p>
             <a:fld id="{48A87A34-81AB-432B-8DAE-1953F412C126}" type="datetimeFigureOut">
               <a:rPr lang="en-US" dirty="0"/>
-              <a:t>12/10/25</a:t>
+              <a:t>12/17/25</a:t>
             </a:fld>
             <a:endParaRPr lang="en-US" dirty="0"/>
           </a:p>
@@ -7666,7 +7671,7 @@
           <a:p>
             <a:fld id="{48A87A34-81AB-432B-8DAE-1953F412C126}" type="datetimeFigureOut">
               <a:rPr lang="en-US" dirty="0"/>
-              <a:t>12/10/25</a:t>
+              <a:t>12/17/25</a:t>
             </a:fld>
             <a:endParaRPr lang="en-US" dirty="0"/>
           </a:p>
@@ -7911,7 +7916,7 @@
           <a:p>
             <a:fld id="{48A87A34-81AB-432B-8DAE-1953F412C126}" type="datetimeFigureOut">
               <a:rPr lang="en-US" dirty="0"/>
-              <a:t>12/10/25</a:t>
+              <a:t>12/17/25</a:t>
             </a:fld>
             <a:endParaRPr lang="en-US" dirty="0"/>
           </a:p>
@@ -8138,7 +8143,7 @@
           <a:p>
             <a:fld id="{48A87A34-81AB-432B-8DAE-1953F412C126}" type="datetimeFigureOut">
               <a:rPr lang="en-US" dirty="0"/>
-              <a:t>12/10/25</a:t>
+              <a:t>12/17/25</a:t>
             </a:fld>
             <a:endParaRPr lang="en-US" dirty="0"/>
           </a:p>
@@ -8514,7 +8519,7 @@
           <a:p>
             <a:fld id="{48A87A34-81AB-432B-8DAE-1953F412C126}" type="datetimeFigureOut">
               <a:rPr lang="en-US" dirty="0"/>
-              <a:t>12/10/25</a:t>
+              <a:t>12/17/25</a:t>
             </a:fld>
             <a:endParaRPr lang="en-US" dirty="0"/>
           </a:p>
@@ -8627,7 +8632,7 @@
           <a:p>
             <a:fld id="{48A87A34-81AB-432B-8DAE-1953F412C126}" type="datetimeFigureOut">
               <a:rPr lang="en-US" dirty="0"/>
-              <a:t>12/10/25</a:t>
+              <a:t>12/17/25</a:t>
             </a:fld>
             <a:endParaRPr lang="en-US" dirty="0"/>
           </a:p>
@@ -8717,7 +8722,7 @@
           <a:p>
             <a:fld id="{48A87A34-81AB-432B-8DAE-1953F412C126}" type="datetimeFigureOut">
               <a:rPr lang="en-US" dirty="0"/>
-              <a:t>12/10/25</a:t>
+              <a:t>12/17/25</a:t>
             </a:fld>
             <a:endParaRPr lang="en-US" dirty="0"/>
           </a:p>
@@ -8961,7 +8966,7 @@
           <a:p>
             <a:fld id="{48A87A34-81AB-432B-8DAE-1953F412C126}" type="datetimeFigureOut">
               <a:rPr lang="en-US" dirty="0"/>
-              <a:t>12/10/25</a:t>
+              <a:t>12/17/25</a:t>
             </a:fld>
             <a:endParaRPr lang="en-US" dirty="0"/>
           </a:p>
@@ -9236,7 +9241,7 @@
           <a:p>
             <a:fld id="{48A87A34-81AB-432B-8DAE-1953F412C126}" type="datetimeFigureOut">
               <a:rPr lang="en-US" dirty="0"/>
-              <a:t>12/10/25</a:t>
+              <a:t>12/17/25</a:t>
             </a:fld>
             <a:endParaRPr lang="en-US" dirty="0"/>
           </a:p>
@@ -9347,7 +9352,7 @@
           <a:noFill/>
           <a:extLst>
             <a:ext uri="{909E8E84-426E-40dd-AFC4-6F175D3DCCD1}">
-              <a14:hiddenFill xmlns:a14="http://schemas.microsoft.com/office/drawing/2010/main" xmlns="">
+              <a14:hiddenFill xmlns="" xmlns:a14="http://schemas.microsoft.com/office/drawing/2010/main">
                 <a:solidFill>
                   <a:srgbClr val="FFFFFF"/>
                 </a:solidFill>
@@ -9421,7 +9426,7 @@
               </a:ln>
               <a:extLst>
                 <a:ext uri="{91240B29-F687-4f45-9708-019B960494DF}">
-                  <a14:hiddenLine xmlns:a14="http://schemas.microsoft.com/office/drawing/2010/main" xmlns="" w="9525">
+                  <a14:hiddenLine xmlns="" xmlns:a14="http://schemas.microsoft.com/office/drawing/2010/main" w="9525">
                     <a:solidFill>
                       <a:srgbClr val="000000"/>
                     </a:solidFill>
@@ -9518,7 +9523,7 @@
               </a:ln>
               <a:extLst>
                 <a:ext uri="{91240B29-F687-4f45-9708-019B960494DF}">
-                  <a14:hiddenLine xmlns:a14="http://schemas.microsoft.com/office/drawing/2010/main" xmlns="" w="9525">
+                  <a14:hiddenLine xmlns="" xmlns:a14="http://schemas.microsoft.com/office/drawing/2010/main" w="9525">
                     <a:solidFill>
                       <a:srgbClr val="000000"/>
                     </a:solidFill>
@@ -9615,7 +9620,7 @@
               </a:ln>
               <a:extLst>
                 <a:ext uri="{91240B29-F687-4f45-9708-019B960494DF}">
-                  <a14:hiddenLine xmlns:a14="http://schemas.microsoft.com/office/drawing/2010/main" xmlns="" w="9525">
+                  <a14:hiddenLine xmlns="" xmlns:a14="http://schemas.microsoft.com/office/drawing/2010/main" w="9525">
                     <a:solidFill>
                       <a:srgbClr val="000000"/>
                     </a:solidFill>
@@ -9684,7 +9689,7 @@
               </a:ln>
               <a:extLst>
                 <a:ext uri="{91240B29-F687-4f45-9708-019B960494DF}">
-                  <a14:hiddenLine xmlns:a14="http://schemas.microsoft.com/office/drawing/2010/main" xmlns="" w="9525">
+                  <a14:hiddenLine xmlns="" xmlns:a14="http://schemas.microsoft.com/office/drawing/2010/main" w="9525">
                     <a:solidFill>
                       <a:srgbClr val="000000"/>
                     </a:solidFill>
@@ -9781,7 +9786,7 @@
               </a:ln>
               <a:extLst>
                 <a:ext uri="{91240B29-F687-4f45-9708-019B960494DF}">
-                  <a14:hiddenLine xmlns:a14="http://schemas.microsoft.com/office/drawing/2010/main" xmlns="" w="9525">
+                  <a14:hiddenLine xmlns="" xmlns:a14="http://schemas.microsoft.com/office/drawing/2010/main" w="9525">
                     <a:solidFill>
                       <a:srgbClr val="000000"/>
                     </a:solidFill>
@@ -9850,7 +9855,7 @@
               </a:ln>
               <a:extLst>
                 <a:ext uri="{91240B29-F687-4f45-9708-019B960494DF}">
-                  <a14:hiddenLine xmlns:a14="http://schemas.microsoft.com/office/drawing/2010/main" xmlns="" w="9525">
+                  <a14:hiddenLine xmlns="" xmlns:a14="http://schemas.microsoft.com/office/drawing/2010/main" w="9525">
                     <a:solidFill>
                       <a:srgbClr val="000000"/>
                     </a:solidFill>
@@ -9919,7 +9924,7 @@
               </a:ln>
               <a:extLst>
                 <a:ext uri="{91240B29-F687-4f45-9708-019B960494DF}">
-                  <a14:hiddenLine xmlns:a14="http://schemas.microsoft.com/office/drawing/2010/main" xmlns="" w="9525">
+                  <a14:hiddenLine xmlns="" xmlns:a14="http://schemas.microsoft.com/office/drawing/2010/main" w="9525">
                     <a:solidFill>
                       <a:srgbClr val="000000"/>
                     </a:solidFill>
@@ -10016,7 +10021,7 @@
               </a:ln>
               <a:extLst>
                 <a:ext uri="{91240B29-F687-4f45-9708-019B960494DF}">
-                  <a14:hiddenLine xmlns:a14="http://schemas.microsoft.com/office/drawing/2010/main" xmlns="" w="9525">
+                  <a14:hiddenLine xmlns="" xmlns:a14="http://schemas.microsoft.com/office/drawing/2010/main" w="9525">
                     <a:solidFill>
                       <a:srgbClr val="000000"/>
                     </a:solidFill>
@@ -10113,7 +10118,7 @@
               </a:ln>
               <a:extLst>
                 <a:ext uri="{91240B29-F687-4f45-9708-019B960494DF}">
-                  <a14:hiddenLine xmlns:a14="http://schemas.microsoft.com/office/drawing/2010/main" xmlns="" w="9525">
+                  <a14:hiddenLine xmlns="" xmlns:a14="http://schemas.microsoft.com/office/drawing/2010/main" w="9525">
                     <a:solidFill>
                       <a:srgbClr val="000000"/>
                     </a:solidFill>
@@ -10182,7 +10187,7 @@
               </a:ln>
               <a:extLst>
                 <a:ext uri="{91240B29-F687-4f45-9708-019B960494DF}">
-                  <a14:hiddenLine xmlns:a14="http://schemas.microsoft.com/office/drawing/2010/main" xmlns="" w="9525">
+                  <a14:hiddenLine xmlns="" xmlns:a14="http://schemas.microsoft.com/office/drawing/2010/main" w="9525">
                     <a:solidFill>
                       <a:srgbClr val="000000"/>
                     </a:solidFill>
@@ -10299,7 +10304,7 @@
               </a:ln>
               <a:extLst>
                 <a:ext uri="{91240B29-F687-4f45-9708-019B960494DF}">
-                  <a14:hiddenLine xmlns:a14="http://schemas.microsoft.com/office/drawing/2010/main" xmlns="" w="9525">
+                  <a14:hiddenLine xmlns="" xmlns:a14="http://schemas.microsoft.com/office/drawing/2010/main" w="9525">
                     <a:solidFill>
                       <a:srgbClr val="000000"/>
                     </a:solidFill>
@@ -10397,7 +10402,7 @@
               </a:ln>
               <a:extLst>
                 <a:ext uri="{91240B29-F687-4f45-9708-019B960494DF}">
-                  <a14:hiddenLine xmlns:a14="http://schemas.microsoft.com/office/drawing/2010/main" xmlns="" w="9525">
+                  <a14:hiddenLine xmlns="" xmlns:a14="http://schemas.microsoft.com/office/drawing/2010/main" w="9525">
                     <a:solidFill>
                       <a:srgbClr val="000000"/>
                     </a:solidFill>
@@ -10466,7 +10471,7 @@
               </a:ln>
               <a:extLst>
                 <a:ext uri="{91240B29-F687-4f45-9708-019B960494DF}">
-                  <a14:hiddenLine xmlns:a14="http://schemas.microsoft.com/office/drawing/2010/main" xmlns="" w="9525">
+                  <a14:hiddenLine xmlns="" xmlns:a14="http://schemas.microsoft.com/office/drawing/2010/main" w="9525">
                     <a:solidFill>
                       <a:srgbClr val="000000"/>
                     </a:solidFill>
@@ -10535,7 +10540,7 @@
               </a:ln>
               <a:extLst>
                 <a:ext uri="{91240B29-F687-4f45-9708-019B960494DF}">
-                  <a14:hiddenLine xmlns:a14="http://schemas.microsoft.com/office/drawing/2010/main" xmlns="" w="9525">
+                  <a14:hiddenLine xmlns="" xmlns:a14="http://schemas.microsoft.com/office/drawing/2010/main" w="9525">
                     <a:solidFill>
                       <a:srgbClr val="000000"/>
                     </a:solidFill>
@@ -10632,7 +10637,7 @@
               </a:ln>
               <a:extLst>
                 <a:ext uri="{91240B29-F687-4f45-9708-019B960494DF}">
-                  <a14:hiddenLine xmlns:a14="http://schemas.microsoft.com/office/drawing/2010/main" xmlns="" w="9525">
+                  <a14:hiddenLine xmlns="" xmlns:a14="http://schemas.microsoft.com/office/drawing/2010/main" w="9525">
                     <a:solidFill>
                       <a:srgbClr val="000000"/>
                     </a:solidFill>
@@ -10673,7 +10678,7 @@
               </a:ln>
               <a:extLst>
                 <a:ext uri="{91240B29-F687-4f45-9708-019B960494DF}">
-                  <a14:hiddenLine xmlns:a14="http://schemas.microsoft.com/office/drawing/2010/main" xmlns="" w="9525">
+                  <a14:hiddenLine xmlns="" xmlns:a14="http://schemas.microsoft.com/office/drawing/2010/main" w="9525">
                     <a:solidFill>
                       <a:srgbClr val="000000"/>
                     </a:solidFill>
@@ -10745,7 +10750,7 @@
               </a:ln>
               <a:extLst>
                 <a:ext uri="{91240B29-F687-4f45-9708-019B960494DF}">
-                  <a14:hiddenLine xmlns:a14="http://schemas.microsoft.com/office/drawing/2010/main" xmlns="" w="9525">
+                  <a14:hiddenLine xmlns="" xmlns:a14="http://schemas.microsoft.com/office/drawing/2010/main" w="9525">
                     <a:solidFill>
                       <a:srgbClr val="000000"/>
                     </a:solidFill>
@@ -10842,7 +10847,7 @@
               </a:ln>
               <a:extLst>
                 <a:ext uri="{91240B29-F687-4f45-9708-019B960494DF}">
-                  <a14:hiddenLine xmlns:a14="http://schemas.microsoft.com/office/drawing/2010/main" xmlns="" w="9525">
+                  <a14:hiddenLine xmlns="" xmlns:a14="http://schemas.microsoft.com/office/drawing/2010/main" w="9525">
                     <a:solidFill>
                       <a:srgbClr val="000000"/>
                     </a:solidFill>
@@ -10911,7 +10916,7 @@
               </a:ln>
               <a:extLst>
                 <a:ext uri="{91240B29-F687-4f45-9708-019B960494DF}">
-                  <a14:hiddenLine xmlns:a14="http://schemas.microsoft.com/office/drawing/2010/main" xmlns="" w="9525">
+                  <a14:hiddenLine xmlns="" xmlns:a14="http://schemas.microsoft.com/office/drawing/2010/main" w="9525">
                     <a:solidFill>
                       <a:srgbClr val="000000"/>
                     </a:solidFill>
@@ -11008,7 +11013,7 @@
               </a:ln>
               <a:extLst>
                 <a:ext uri="{91240B29-F687-4f45-9708-019B960494DF}">
-                  <a14:hiddenLine xmlns:a14="http://schemas.microsoft.com/office/drawing/2010/main" xmlns="" w="9525">
+                  <a14:hiddenLine xmlns="" xmlns:a14="http://schemas.microsoft.com/office/drawing/2010/main" w="9525">
                     <a:solidFill>
                       <a:srgbClr val="000000"/>
                     </a:solidFill>
@@ -11080,7 +11085,7 @@
               </a:ln>
               <a:extLst>
                 <a:ext uri="{91240B29-F687-4f45-9708-019B960494DF}">
-                  <a14:hiddenLine xmlns:a14="http://schemas.microsoft.com/office/drawing/2010/main" xmlns="" w="9525">
+                  <a14:hiddenLine xmlns="" xmlns:a14="http://schemas.microsoft.com/office/drawing/2010/main" w="9525">
                     <a:solidFill>
                       <a:srgbClr val="000000"/>
                     </a:solidFill>
@@ -11149,7 +11154,7 @@
               </a:ln>
               <a:extLst>
                 <a:ext uri="{91240B29-F687-4f45-9708-019B960494DF}">
-                  <a14:hiddenLine xmlns:a14="http://schemas.microsoft.com/office/drawing/2010/main" xmlns="" w="9525">
+                  <a14:hiddenLine xmlns="" xmlns:a14="http://schemas.microsoft.com/office/drawing/2010/main" w="9525">
                     <a:solidFill>
                       <a:srgbClr val="000000"/>
                     </a:solidFill>
@@ -11246,7 +11251,7 @@
               </a:ln>
               <a:extLst>
                 <a:ext uri="{91240B29-F687-4f45-9708-019B960494DF}">
-                  <a14:hiddenLine xmlns:a14="http://schemas.microsoft.com/office/drawing/2010/main" xmlns="" w="9525">
+                  <a14:hiddenLine xmlns="" xmlns:a14="http://schemas.microsoft.com/office/drawing/2010/main" w="9525">
                     <a:solidFill>
                       <a:srgbClr val="000000"/>
                     </a:solidFill>
@@ -11343,7 +11348,7 @@
               </a:ln>
               <a:extLst>
                 <a:ext uri="{91240B29-F687-4f45-9708-019B960494DF}">
-                  <a14:hiddenLine xmlns:a14="http://schemas.microsoft.com/office/drawing/2010/main" xmlns="" w="9525">
+                  <a14:hiddenLine xmlns="" xmlns:a14="http://schemas.microsoft.com/office/drawing/2010/main" w="9525">
                     <a:solidFill>
                       <a:srgbClr val="000000"/>
                     </a:solidFill>
@@ -11415,7 +11420,7 @@
               </a:ln>
               <a:extLst>
                 <a:ext uri="{91240B29-F687-4f45-9708-019B960494DF}">
-                  <a14:hiddenLine xmlns:a14="http://schemas.microsoft.com/office/drawing/2010/main" xmlns="" w="9525">
+                  <a14:hiddenLine xmlns="" xmlns:a14="http://schemas.microsoft.com/office/drawing/2010/main" w="9525">
                     <a:solidFill>
                       <a:srgbClr val="000000"/>
                     </a:solidFill>
@@ -11542,7 +11547,7 @@
               </a:ln>
               <a:extLst>
                 <a:ext uri="{91240B29-F687-4f45-9708-019B960494DF}">
-                  <a14:hiddenLine xmlns:a14="http://schemas.microsoft.com/office/drawing/2010/main" xmlns="" w="9525">
+                  <a14:hiddenLine xmlns="" xmlns:a14="http://schemas.microsoft.com/office/drawing/2010/main" w="9525">
                     <a:solidFill>
                       <a:srgbClr val="000000"/>
                     </a:solidFill>
@@ -11647,7 +11652,7 @@
               </a:ln>
               <a:extLst>
                 <a:ext uri="{91240B29-F687-4f45-9708-019B960494DF}">
-                  <a14:hiddenLine xmlns:a14="http://schemas.microsoft.com/office/drawing/2010/main" xmlns="" w="9525">
+                  <a14:hiddenLine xmlns="" xmlns:a14="http://schemas.microsoft.com/office/drawing/2010/main" w="9525">
                     <a:solidFill>
                       <a:srgbClr val="000000"/>
                     </a:solidFill>
@@ -11769,7 +11774,7 @@
               </a:ln>
               <a:extLst>
                 <a:ext uri="{91240B29-F687-4f45-9708-019B960494DF}">
-                  <a14:hiddenLine xmlns:a14="http://schemas.microsoft.com/office/drawing/2010/main" xmlns="" w="9525">
+                  <a14:hiddenLine xmlns="" xmlns:a14="http://schemas.microsoft.com/office/drawing/2010/main" w="9525">
                     <a:solidFill>
                       <a:srgbClr val="000000"/>
                     </a:solidFill>
@@ -11866,7 +11871,7 @@
               </a:ln>
               <a:extLst>
                 <a:ext uri="{91240B29-F687-4f45-9708-019B960494DF}">
-                  <a14:hiddenLine xmlns:a14="http://schemas.microsoft.com/office/drawing/2010/main" xmlns="" w="9525">
+                  <a14:hiddenLine xmlns="" xmlns:a14="http://schemas.microsoft.com/office/drawing/2010/main" w="9525">
                     <a:solidFill>
                       <a:srgbClr val="000000"/>
                     </a:solidFill>
@@ -11938,7 +11943,7 @@
               </a:ln>
               <a:extLst>
                 <a:ext uri="{91240B29-F687-4f45-9708-019B960494DF}">
-                  <a14:hiddenLine xmlns:a14="http://schemas.microsoft.com/office/drawing/2010/main" xmlns="" w="9525">
+                  <a14:hiddenLine xmlns="" xmlns:a14="http://schemas.microsoft.com/office/drawing/2010/main" w="9525">
                     <a:solidFill>
                       <a:srgbClr val="000000"/>
                     </a:solidFill>
@@ -12035,7 +12040,7 @@
               </a:ln>
               <a:extLst>
                 <a:ext uri="{91240B29-F687-4f45-9708-019B960494DF}">
-                  <a14:hiddenLine xmlns:a14="http://schemas.microsoft.com/office/drawing/2010/main" xmlns="" w="9525">
+                  <a14:hiddenLine xmlns="" xmlns:a14="http://schemas.microsoft.com/office/drawing/2010/main" w="9525">
                     <a:solidFill>
                       <a:srgbClr val="000000"/>
                     </a:solidFill>
@@ -12110,7 +12115,7 @@
               </a:ln>
               <a:extLst>
                 <a:ext uri="{91240B29-F687-4f45-9708-019B960494DF}">
-                  <a14:hiddenLine xmlns:a14="http://schemas.microsoft.com/office/drawing/2010/main" xmlns="" w="9525">
+                  <a14:hiddenLine xmlns="" xmlns:a14="http://schemas.microsoft.com/office/drawing/2010/main" w="9525">
                     <a:solidFill>
                       <a:srgbClr val="000000"/>
                     </a:solidFill>
@@ -12207,7 +12212,7 @@
               </a:ln>
               <a:extLst>
                 <a:ext uri="{91240B29-F687-4f45-9708-019B960494DF}">
-                  <a14:hiddenLine xmlns:a14="http://schemas.microsoft.com/office/drawing/2010/main" xmlns="" w="9525">
+                  <a14:hiddenLine xmlns="" xmlns:a14="http://schemas.microsoft.com/office/drawing/2010/main" w="9525">
                     <a:solidFill>
                       <a:srgbClr val="000000"/>
                     </a:solidFill>
@@ -12282,7 +12287,7 @@
               </a:ln>
               <a:extLst>
                 <a:ext uri="{91240B29-F687-4f45-9708-019B960494DF}">
-                  <a14:hiddenLine xmlns:a14="http://schemas.microsoft.com/office/drawing/2010/main" xmlns="" w="9525">
+                  <a14:hiddenLine xmlns="" xmlns:a14="http://schemas.microsoft.com/office/drawing/2010/main" w="9525">
                     <a:solidFill>
                       <a:srgbClr val="000000"/>
                     </a:solidFill>
@@ -12379,7 +12384,7 @@
               </a:ln>
               <a:extLst>
                 <a:ext uri="{91240B29-F687-4f45-9708-019B960494DF}">
-                  <a14:hiddenLine xmlns:a14="http://schemas.microsoft.com/office/drawing/2010/main" xmlns="" w="9525">
+                  <a14:hiddenLine xmlns="" xmlns:a14="http://schemas.microsoft.com/office/drawing/2010/main" w="9525">
                     <a:solidFill>
                       <a:srgbClr val="000000"/>
                     </a:solidFill>
@@ -12420,7 +12425,7 @@
               </a:ln>
               <a:extLst>
                 <a:ext uri="{91240B29-F687-4f45-9708-019B960494DF}">
-                  <a14:hiddenLine xmlns:a14="http://schemas.microsoft.com/office/drawing/2010/main" xmlns="" w="9525">
+                  <a14:hiddenLine xmlns="" xmlns:a14="http://schemas.microsoft.com/office/drawing/2010/main" w="9525">
                     <a:solidFill>
                       <a:srgbClr val="000000"/>
                     </a:solidFill>
@@ -12568,7 +12573,7 @@
             <a:fld id="{48A87A34-81AB-432B-8DAE-1953F412C126}" type="datetimeFigureOut">
               <a:rPr lang="en-US" dirty="0"/>
               <a:pPr/>
-              <a:t>12/10/25</a:t>
+              <a:t>12/17/25</a:t>
             </a:fld>
             <a:endParaRPr lang="en-US" dirty="0"/>
           </a:p>
@@ -13122,7 +13127,7 @@
         </p:spPr>
         <p:txBody>
           <a:bodyPr>
-            <a:normAutofit fontScale="85000" lnSpcReduction="10000"/>
+            <a:normAutofit fontScale="85000" lnSpcReduction="20000"/>
           </a:bodyPr>
           <a:lstStyle/>
           <a:p>
@@ -13142,6 +13147,14 @@
             </a:r>
             <a:r>
               <a:rPr lang="en-US" dirty="0"/>
+              <a:t> or </a:t>
+            </a:r>
+            <a:r>
+              <a:rPr lang="en-US" dirty="0" err="1"/>
+              <a:t>SimpleTracker.java</a:t>
+            </a:r>
+            <a:r>
+              <a:rPr lang="en-US" dirty="0"/>
               <a:t>) meant to both add expenses to tracker (stored in a csv file) and to analyze the data</a:t>
             </a:r>
           </a:p>
@@ -13153,6 +13166,14 @@
             <a:r>
               <a:rPr lang="en-US" dirty="0" err="1"/>
               <a:t>tracking.py</a:t>
+            </a:r>
+            <a:r>
+              <a:rPr lang="en-US" dirty="0"/>
+              <a:t> and </a:t>
+            </a:r>
+            <a:r>
+              <a:rPr lang="en-US" dirty="0" err="1"/>
+              <a:t>tracking_j.java</a:t>
             </a:r>
             <a:r>
               <a:rPr lang="en-US" dirty="0"/>
@@ -13258,8 +13279,13 @@
             </a:r>
             <a:r>
               <a:rPr lang="en-US" dirty="0"/>
-              <a:t> </a:t>
+              <a:t> or </a:t>
             </a:r>
+            <a:r>
+              <a:rPr lang="en-US" dirty="0" err="1"/>
+              <a:t>tracking_j.java</a:t>
+            </a:r>
+            <a:endParaRPr lang="en-US" dirty="0"/>
           </a:p>
           <a:p>
             <a:pPr lvl="1"/>
@@ -13277,6 +13303,14 @@
               <a:rPr lang="en-US" dirty="0" err="1"/>
               <a:t>Tracker.py</a:t>
             </a:r>
+            <a:r>
+              <a:rPr lang="en-US" dirty="0"/>
+              <a:t> or </a:t>
+            </a:r>
+            <a:r>
+              <a:rPr lang="en-US" dirty="0" err="1"/>
+              <a:t>SimpleTracker.java</a:t>
+            </a:r>
             <a:endParaRPr lang="en-US" dirty="0"/>
           </a:p>
           <a:p>
@@ -13294,6 +13328,14 @@
             <a:r>
               <a:rPr lang="en-US" dirty="0" err="1"/>
               <a:t>data.csv</a:t>
+            </a:r>
+            <a:r>
+              <a:rPr lang="en-US" dirty="0"/>
+              <a:t> or </a:t>
+            </a:r>
+            <a:r>
+              <a:rPr lang="en-US" dirty="0" err="1"/>
+              <a:t>data_j.csv</a:t>
             </a:r>
             <a:endParaRPr lang="en-US" dirty="0"/>
           </a:p>

</xml_diff>